<commit_message>
Minor fixes on loops basics
</commit_message>
<xml_diff>
--- a/Courses/Software-Sciences/Module-1-OOP/04.1-Loops-Basics/04.1-Loops-Basics.pptx
+++ b/Courses/Software-Sciences/Module-1-OOP/04.1-Loops-Basics/04.1-Loops-Basics.pptx
@@ -335,7 +335,7 @@
           <a:p>
             <a:fld id="{4E087215-0C8F-4762-A664-737A353EC9A4}" type="datetimeFigureOut">
               <a:rPr lang="bg-BG" smtClean="0"/>
-              <a:t>11.05.23 г.</a:t>
+              <a:t>17.05.23 г.</a:t>
             </a:fld>
             <a:endParaRPr lang="bg-BG"/>
           </a:p>
@@ -526,7 +526,7 @@
           <a:p>
             <a:fld id="{72D84649-876A-46C9-8472-14CB09C070D8}" type="datetimeFigureOut">
               <a:rPr lang="en-US" smtClean="0"/>
-              <a:t>5/11/23</a:t>
+              <a:t>5/17/23</a:t>
             </a:fld>
             <a:endParaRPr lang="en-US"/>
           </a:p>
@@ -18454,7 +18454,7 @@
         </p:nvSpPr>
         <p:spPr>
           <a:xfrm>
-            <a:off x="1271464" y="6237313"/>
+            <a:off x="1199456" y="6307009"/>
             <a:ext cx="9793088" cy="399981"/>
           </a:xfrm>
           <a:prstGeom prst="rect">
@@ -25864,7 +25864,7 @@
         </p:nvSpPr>
         <p:spPr>
           <a:xfrm>
-            <a:off x="507349" y="6174000"/>
+            <a:off x="507349" y="6266116"/>
             <a:ext cx="11177301" cy="400110"/>
           </a:xfrm>
           <a:prstGeom prst="rect">
@@ -27794,7 +27794,15 @@
           <a:p>
             <a:r>
               <a:rPr lang="bg-BG" dirty="0"/>
-              <a:t>Пример – часовник (1)</a:t>
+              <a:t>Пример</a:t>
+            </a:r>
+            <a:r>
+              <a:rPr lang="en-US" dirty="0"/>
+              <a:t>:</a:t>
+            </a:r>
+            <a:r>
+              <a:rPr lang="bg-BG" dirty="0"/>
+              <a:t> часовник (1)</a:t>
             </a:r>
             <a:endParaRPr lang="en-US" dirty="0"/>
           </a:p>
@@ -32070,7 +32078,7 @@
           <a:p>
             <a:r>
               <a:rPr lang="en-US" noProof="1"/>
-              <a:t>Пример – часовник (2)</a:t>
+              <a:t>Пример: часовник (2)</a:t>
             </a:r>
           </a:p>
         </p:txBody>

</xml_diff>